<commit_message>
Add For TapeOut DRAM Controller With Virtual DRAM Logic Die
</commit_message>
<xml_diff>
--- a/DRAM_System_Analysis/PowerPoints/WUPR_Architecture_Graph.pptx
+++ b/DRAM_System_Analysis/PowerPoints/WUPR_Architecture_Graph.pptx
@@ -269,7 +269,7 @@
           <a:p>
             <a:fld id="{F15DAA47-81C0-42FD-A52E-49570AD7C90F}" type="datetimeFigureOut">
               <a:rPr lang="zh-TW" altLang="en-US" smtClean="0"/>
-              <a:t>2025/6/25</a:t>
+              <a:t>2025/7/2</a:t>
             </a:fld>
             <a:endParaRPr lang="zh-TW" altLang="en-US"/>
           </a:p>
@@ -467,7 +467,7 @@
           <a:p>
             <a:fld id="{F15DAA47-81C0-42FD-A52E-49570AD7C90F}" type="datetimeFigureOut">
               <a:rPr lang="zh-TW" altLang="en-US" smtClean="0"/>
-              <a:t>2025/6/25</a:t>
+              <a:t>2025/7/2</a:t>
             </a:fld>
             <a:endParaRPr lang="zh-TW" altLang="en-US"/>
           </a:p>
@@ -675,7 +675,7 @@
           <a:p>
             <a:fld id="{F15DAA47-81C0-42FD-A52E-49570AD7C90F}" type="datetimeFigureOut">
               <a:rPr lang="zh-TW" altLang="en-US" smtClean="0"/>
-              <a:t>2025/6/25</a:t>
+              <a:t>2025/7/2</a:t>
             </a:fld>
             <a:endParaRPr lang="zh-TW" altLang="en-US"/>
           </a:p>
@@ -873,7 +873,7 @@
           <a:p>
             <a:fld id="{F15DAA47-81C0-42FD-A52E-49570AD7C90F}" type="datetimeFigureOut">
               <a:rPr lang="zh-TW" altLang="en-US" smtClean="0"/>
-              <a:t>2025/6/25</a:t>
+              <a:t>2025/7/2</a:t>
             </a:fld>
             <a:endParaRPr lang="zh-TW" altLang="en-US"/>
           </a:p>
@@ -1148,7 +1148,7 @@
           <a:p>
             <a:fld id="{F15DAA47-81C0-42FD-A52E-49570AD7C90F}" type="datetimeFigureOut">
               <a:rPr lang="zh-TW" altLang="en-US" smtClean="0"/>
-              <a:t>2025/6/25</a:t>
+              <a:t>2025/7/2</a:t>
             </a:fld>
             <a:endParaRPr lang="zh-TW" altLang="en-US"/>
           </a:p>
@@ -1413,7 +1413,7 @@
           <a:p>
             <a:fld id="{F15DAA47-81C0-42FD-A52E-49570AD7C90F}" type="datetimeFigureOut">
               <a:rPr lang="zh-TW" altLang="en-US" smtClean="0"/>
-              <a:t>2025/6/25</a:t>
+              <a:t>2025/7/2</a:t>
             </a:fld>
             <a:endParaRPr lang="zh-TW" altLang="en-US"/>
           </a:p>
@@ -1825,7 +1825,7 @@
           <a:p>
             <a:fld id="{F15DAA47-81C0-42FD-A52E-49570AD7C90F}" type="datetimeFigureOut">
               <a:rPr lang="zh-TW" altLang="en-US" smtClean="0"/>
-              <a:t>2025/6/25</a:t>
+              <a:t>2025/7/2</a:t>
             </a:fld>
             <a:endParaRPr lang="zh-TW" altLang="en-US"/>
           </a:p>
@@ -1966,7 +1966,7 @@
           <a:p>
             <a:fld id="{F15DAA47-81C0-42FD-A52E-49570AD7C90F}" type="datetimeFigureOut">
               <a:rPr lang="zh-TW" altLang="en-US" smtClean="0"/>
-              <a:t>2025/6/25</a:t>
+              <a:t>2025/7/2</a:t>
             </a:fld>
             <a:endParaRPr lang="zh-TW" altLang="en-US"/>
           </a:p>
@@ -2079,7 +2079,7 @@
           <a:p>
             <a:fld id="{F15DAA47-81C0-42FD-A52E-49570AD7C90F}" type="datetimeFigureOut">
               <a:rPr lang="zh-TW" altLang="en-US" smtClean="0"/>
-              <a:t>2025/6/25</a:t>
+              <a:t>2025/7/2</a:t>
             </a:fld>
             <a:endParaRPr lang="zh-TW" altLang="en-US"/>
           </a:p>
@@ -2390,7 +2390,7 @@
           <a:p>
             <a:fld id="{F15DAA47-81C0-42FD-A52E-49570AD7C90F}" type="datetimeFigureOut">
               <a:rPr lang="zh-TW" altLang="en-US" smtClean="0"/>
-              <a:t>2025/6/25</a:t>
+              <a:t>2025/7/2</a:t>
             </a:fld>
             <a:endParaRPr lang="zh-TW" altLang="en-US"/>
           </a:p>
@@ -2678,7 +2678,7 @@
           <a:p>
             <a:fld id="{F15DAA47-81C0-42FD-A52E-49570AD7C90F}" type="datetimeFigureOut">
               <a:rPr lang="zh-TW" altLang="en-US" smtClean="0"/>
-              <a:t>2025/6/25</a:t>
+              <a:t>2025/7/2</a:t>
             </a:fld>
             <a:endParaRPr lang="zh-TW" altLang="en-US"/>
           </a:p>
@@ -2919,7 +2919,7 @@
           <a:p>
             <a:fld id="{F15DAA47-81C0-42FD-A52E-49570AD7C90F}" type="datetimeFigureOut">
               <a:rPr lang="zh-TW" altLang="en-US" smtClean="0"/>
-              <a:t>2025/6/25</a:t>
+              <a:t>2025/7/2</a:t>
             </a:fld>
             <a:endParaRPr lang="zh-TW" altLang="en-US"/>
           </a:p>

</xml_diff>